<commit_message>
Updating Slides For Session 2
</commit_message>
<xml_diff>
--- a/doc/Day2_Session2_ModelEvaluation.pptx
+++ b/doc/Day2_Session2_ModelEvaluation.pptx
@@ -263,7 +263,7 @@
           <a:p>
             <a:fld id="{809D2D7E-A1B1-4742-AA41-21EC310460A0}" type="datetimeFigureOut">
               <a:rPr lang="en-US" smtClean="0"/>
-              <a:t>2/12/20</a:t>
+              <a:t>2/14/20</a:t>
             </a:fld>
             <a:endParaRPr lang="en-US"/>
           </a:p>
@@ -433,7 +433,7 @@
           <a:p>
             <a:fld id="{809D2D7E-A1B1-4742-AA41-21EC310460A0}" type="datetimeFigureOut">
               <a:rPr lang="en-US" smtClean="0"/>
-              <a:t>2/12/20</a:t>
+              <a:t>2/14/20</a:t>
             </a:fld>
             <a:endParaRPr lang="en-US"/>
           </a:p>
@@ -613,7 +613,7 @@
           <a:p>
             <a:fld id="{809D2D7E-A1B1-4742-AA41-21EC310460A0}" type="datetimeFigureOut">
               <a:rPr lang="en-US" smtClean="0"/>
-              <a:t>2/12/20</a:t>
+              <a:t>2/14/20</a:t>
             </a:fld>
             <a:endParaRPr lang="en-US"/>
           </a:p>
@@ -783,7 +783,7 @@
           <a:p>
             <a:fld id="{809D2D7E-A1B1-4742-AA41-21EC310460A0}" type="datetimeFigureOut">
               <a:rPr lang="en-US" smtClean="0"/>
-              <a:t>2/12/20</a:t>
+              <a:t>2/14/20</a:t>
             </a:fld>
             <a:endParaRPr lang="en-US"/>
           </a:p>
@@ -1027,7 +1027,7 @@
           <a:p>
             <a:fld id="{809D2D7E-A1B1-4742-AA41-21EC310460A0}" type="datetimeFigureOut">
               <a:rPr lang="en-US" smtClean="0"/>
-              <a:t>2/12/20</a:t>
+              <a:t>2/14/20</a:t>
             </a:fld>
             <a:endParaRPr lang="en-US"/>
           </a:p>
@@ -1259,7 +1259,7 @@
           <a:p>
             <a:fld id="{809D2D7E-A1B1-4742-AA41-21EC310460A0}" type="datetimeFigureOut">
               <a:rPr lang="en-US" smtClean="0"/>
-              <a:t>2/12/20</a:t>
+              <a:t>2/14/20</a:t>
             </a:fld>
             <a:endParaRPr lang="en-US"/>
           </a:p>
@@ -1626,7 +1626,7 @@
           <a:p>
             <a:fld id="{809D2D7E-A1B1-4742-AA41-21EC310460A0}" type="datetimeFigureOut">
               <a:rPr lang="en-US" smtClean="0"/>
-              <a:t>2/12/20</a:t>
+              <a:t>2/14/20</a:t>
             </a:fld>
             <a:endParaRPr lang="en-US"/>
           </a:p>
@@ -1744,7 +1744,7 @@
           <a:p>
             <a:fld id="{809D2D7E-A1B1-4742-AA41-21EC310460A0}" type="datetimeFigureOut">
               <a:rPr lang="en-US" smtClean="0"/>
-              <a:t>2/12/20</a:t>
+              <a:t>2/14/20</a:t>
             </a:fld>
             <a:endParaRPr lang="en-US"/>
           </a:p>
@@ -1839,7 +1839,7 @@
           <a:p>
             <a:fld id="{809D2D7E-A1B1-4742-AA41-21EC310460A0}" type="datetimeFigureOut">
               <a:rPr lang="en-US" smtClean="0"/>
-              <a:t>2/12/20</a:t>
+              <a:t>2/14/20</a:t>
             </a:fld>
             <a:endParaRPr lang="en-US"/>
           </a:p>
@@ -2116,7 +2116,7 @@
           <a:p>
             <a:fld id="{809D2D7E-A1B1-4742-AA41-21EC310460A0}" type="datetimeFigureOut">
               <a:rPr lang="en-US" smtClean="0"/>
-              <a:t>2/12/20</a:t>
+              <a:t>2/14/20</a:t>
             </a:fld>
             <a:endParaRPr lang="en-US"/>
           </a:p>
@@ -2373,7 +2373,7 @@
           <a:p>
             <a:fld id="{809D2D7E-A1B1-4742-AA41-21EC310460A0}" type="datetimeFigureOut">
               <a:rPr lang="en-US" smtClean="0"/>
-              <a:t>2/12/20</a:t>
+              <a:t>2/14/20</a:t>
             </a:fld>
             <a:endParaRPr lang="en-US"/>
           </a:p>
@@ -2586,7 +2586,7 @@
           <a:p>
             <a:fld id="{809D2D7E-A1B1-4742-AA41-21EC310460A0}" type="datetimeFigureOut">
               <a:rPr lang="en-US" smtClean="0"/>
-              <a:t>2/12/20</a:t>
+              <a:t>2/14/20</a:t>
             </a:fld>
             <a:endParaRPr lang="en-US"/>
           </a:p>
@@ -5092,19 +5092,25 @@
               <a:rPr lang="en-US" dirty="0">
                 <a:latin typeface="Courier" pitchFamily="2" charset="0"/>
               </a:rPr>
-              <a:t>parameters = {</a:t>
-            </a:r>
-            <a:r>
-              <a:rPr lang="en-US" dirty="0">
+              <a:t>parameters = </a:t>
+            </a:r>
+            <a:r>
+              <a:rPr lang="en-US">
+                <a:latin typeface="Courier" pitchFamily="2" charset="0"/>
+              </a:rPr>
+              <a:t>{</a:t>
+            </a:r>
+            <a:r>
+              <a:rPr lang="en-US">
                 <a:solidFill>
                   <a:srgbClr val="FF0000"/>
                 </a:solidFill>
                 <a:latin typeface="Courier" pitchFamily="2" charset="0"/>
               </a:rPr>
-              <a:t>'p’</a:t>
-            </a:r>
-            <a:r>
-              <a:rPr lang="en-US" dirty="0">
+              <a:t>'p'</a:t>
+            </a:r>
+            <a:r>
+              <a:rPr lang="en-US">
                 <a:latin typeface="Courier" pitchFamily="2" charset="0"/>
               </a:rPr>
               <a:t>:[</a:t>
@@ -5227,7 +5233,7 @@
                 </a:solidFill>
                 <a:latin typeface="Courier" pitchFamily="2" charset="0"/>
               </a:rPr>
-              <a:t>’</a:t>
+              <a:t>'</a:t>
             </a:r>
             <a:r>
               <a:rPr lang="en-US" dirty="0">
@@ -7744,8 +7750,8 @@
           </a:p>
         </p:txBody>
       </p:sp>
-      <mc:AlternateContent xmlns:mc="http://schemas.openxmlformats.org/markup-compatibility/2006" xmlns:a14="http://schemas.microsoft.com/office/drawing/2010/main">
-        <mc:Choice Requires="a14">
+      <mc:AlternateContent xmlns:mc="http://schemas.openxmlformats.org/markup-compatibility/2006">
+        <mc:Choice xmlns:a14="http://schemas.microsoft.com/office/drawing/2010/main" Requires="a14">
           <p:sp>
             <p:nvSpPr>
               <p:cNvPr id="19" name="TextBox 18">
@@ -7978,7 +7984,13 @@
                           <a:rPr lang="en-US" b="0" i="1" smtClean="0">
                             <a:latin typeface="Cambria Math" panose="02040503050406030204" pitchFamily="18" charset="0"/>
                           </a:rPr>
-                          <m:t>𝑇𝑃</m:t>
+                          <m:t>𝑇</m:t>
+                        </m:r>
+                        <m:r>
+                          <a:rPr lang="en-US" b="0" i="1" smtClean="0">
+                            <a:latin typeface="Cambria Math" panose="02040503050406030204" pitchFamily="18" charset="0"/>
+                          </a:rPr>
+                          <m:t>𝑁</m:t>
                         </m:r>
                       </m:den>
                     </m:f>
@@ -8463,7 +8475,7 @@
             </p:txBody>
           </p:sp>
         </mc:Choice>
-        <mc:Fallback xmlns="">
+        <mc:Fallback>
           <p:sp>
             <p:nvSpPr>
               <p:cNvPr id="19" name="TextBox 18">

</xml_diff>